<commit_message>
Add AI speed comparison (minutes vs days)
- Slide 11 redesigned: shorter capability cards + speed comparison table
  showing traditional vs AI time for all 7 deliverables
- README: new "AI Speed Comparison" section with matching table

Co-Authored-By: Claude Opus 4.6 <noreply@anthropic.com>
</commit_message>
<xml_diff>
--- a/Auto_Insurance_AI_Demo_V2.pptx
+++ b/Auto_Insurance_AI_Demo_V2.pptx
@@ -6178,8 +6178,8 @@
         </p:nvSpPr>
         <p:spPr>
           <a:xfrm>
-            <a:off x="731520" y="365760"/>
-            <a:ext cx="10058400" cy="548640"/>
+            <a:off x="731520" y="228600"/>
+            <a:ext cx="10058400" cy="457200"/>
           </a:xfrm>
           <a:prstGeom prst="rect">
             <a:avLst/>
@@ -6193,7 +6193,7 @@
           <a:lstStyle/>
           <a:p>
             <a:pPr algn="l">
-              <a:defRPr sz="3200" b="1">
+              <a:defRPr sz="2800" b="1">
                 <a:solidFill>
                   <a:srgbClr val="E4E6ED"/>
                 </a:solidFill>
@@ -6214,8 +6214,8 @@
         </p:nvSpPr>
         <p:spPr>
           <a:xfrm>
-            <a:off x="731520" y="914400"/>
-            <a:ext cx="10058400" cy="365760"/>
+            <a:off x="731520" y="731520"/>
+            <a:ext cx="10058400" cy="320040"/>
           </a:xfrm>
           <a:prstGeom prst="rect">
             <a:avLst/>
@@ -6229,7 +6229,7 @@
           <a:lstStyle/>
           <a:p>
             <a:pPr algn="l">
-              <a:defRPr sz="1400" b="0">
+              <a:defRPr sz="1200" b="0">
                 <a:solidFill>
                   <a:srgbClr val="8B8FA3"/>
                 </a:solidFill>
@@ -6250,8 +6250,8 @@
         </p:nvSpPr>
         <p:spPr>
           <a:xfrm>
-            <a:off x="457200" y="1554480"/>
-            <a:ext cx="1508760" cy="2743200"/>
+            <a:off x="457200" y="1143000"/>
+            <a:ext cx="1508760" cy="1828800"/>
           </a:xfrm>
           <a:prstGeom prst="roundRect">
             <a:avLst>
@@ -6297,7 +6297,7 @@
         </p:nvSpPr>
         <p:spPr>
           <a:xfrm>
-            <a:off x="457200" y="1554480"/>
+            <a:off x="457200" y="1143000"/>
             <a:ext cx="1508760" cy="45720"/>
           </a:xfrm>
           <a:prstGeom prst="rect">
@@ -6340,8 +6340,8 @@
         </p:nvSpPr>
         <p:spPr>
           <a:xfrm>
-            <a:off x="594360" y="1737360"/>
-            <a:ext cx="365760" cy="365760"/>
+            <a:off x="566928" y="1261872"/>
+            <a:ext cx="320040" cy="320040"/>
           </a:xfrm>
           <a:prstGeom prst="roundRect">
             <a:avLst>
@@ -6385,8 +6385,8 @@
         </p:nvSpPr>
         <p:spPr>
           <a:xfrm>
-            <a:off x="594360" y="1737360"/>
-            <a:ext cx="365760" cy="365760"/>
+            <a:off x="566928" y="1261872"/>
+            <a:ext cx="320040" cy="320040"/>
           </a:xfrm>
           <a:prstGeom prst="rect">
             <a:avLst/>
@@ -6400,7 +6400,7 @@
           <a:lstStyle/>
           <a:p>
             <a:pPr algn="ctr">
-              <a:defRPr sz="1400" b="1">
+              <a:defRPr sz="1100" b="1">
                 <a:solidFill>
                   <a:srgbClr val="E4E6ED"/>
                 </a:solidFill>
@@ -6421,8 +6421,8 @@
         </p:nvSpPr>
         <p:spPr>
           <a:xfrm>
-            <a:off x="594360" y="2286000"/>
-            <a:ext cx="1234440" cy="274320"/>
+            <a:off x="548640" y="1691640"/>
+            <a:ext cx="1325880" cy="256032"/>
           </a:xfrm>
           <a:prstGeom prst="rect">
             <a:avLst/>
@@ -6436,7 +6436,7 @@
           <a:lstStyle/>
           <a:p>
             <a:pPr algn="l">
-              <a:defRPr sz="1200" b="1">
+              <a:defRPr sz="1100" b="1">
                 <a:solidFill>
                   <a:srgbClr val="818CF8"/>
                 </a:solidFill>
@@ -6457,8 +6457,8 @@
         </p:nvSpPr>
         <p:spPr>
           <a:xfrm>
-            <a:off x="594360" y="2651760"/>
-            <a:ext cx="1234440" cy="1097280"/>
+            <a:off x="548640" y="1965960"/>
+            <a:ext cx="1325880" cy="731520"/>
           </a:xfrm>
           <a:prstGeom prst="rect">
             <a:avLst/>
@@ -6472,7 +6472,7 @@
           <a:lstStyle/>
           <a:p>
             <a:pPr algn="l">
-              <a:defRPr sz="1000" b="0">
+              <a:defRPr sz="900" b="0">
                 <a:solidFill>
                   <a:srgbClr val="8B8FA3"/>
                 </a:solidFill>
@@ -6480,11 +6480,11 @@
               </a:defRPr>
             </a:pPr>
             <a:r>
-              <a:t>10K realistic records</a:t>
+              <a:t>10K realistic</a:t>
             </a:r>
             <a:br/>
             <a:r>
-              <a:t>with risk correlations</a:t>
+              <a:t>records</a:t>
             </a:r>
           </a:p>
         </p:txBody>
@@ -6497,8 +6497,8 @@
         </p:nvSpPr>
         <p:spPr>
           <a:xfrm>
-            <a:off x="2121408" y="1554480"/>
-            <a:ext cx="1508760" cy="2743200"/>
+            <a:off x="2121408" y="1143000"/>
+            <a:ext cx="1508760" cy="1828800"/>
           </a:xfrm>
           <a:prstGeom prst="roundRect">
             <a:avLst>
@@ -6544,7 +6544,7 @@
         </p:nvSpPr>
         <p:spPr>
           <a:xfrm>
-            <a:off x="2121408" y="1554480"/>
+            <a:off x="2121408" y="1143000"/>
             <a:ext cx="1508760" cy="45720"/>
           </a:xfrm>
           <a:prstGeom prst="rect">
@@ -6587,8 +6587,8 @@
         </p:nvSpPr>
         <p:spPr>
           <a:xfrm>
-            <a:off x="2258568" y="1737360"/>
-            <a:ext cx="365760" cy="365760"/>
+            <a:off x="2231136" y="1261872"/>
+            <a:ext cx="320040" cy="320040"/>
           </a:xfrm>
           <a:prstGeom prst="roundRect">
             <a:avLst>
@@ -6632,8 +6632,8 @@
         </p:nvSpPr>
         <p:spPr>
           <a:xfrm>
-            <a:off x="2258568" y="1737360"/>
-            <a:ext cx="365760" cy="365760"/>
+            <a:off x="2231136" y="1261872"/>
+            <a:ext cx="320040" cy="320040"/>
           </a:xfrm>
           <a:prstGeom prst="rect">
             <a:avLst/>
@@ -6647,7 +6647,7 @@
           <a:lstStyle/>
           <a:p>
             <a:pPr algn="ctr">
-              <a:defRPr sz="1400" b="1">
+              <a:defRPr sz="1100" b="1">
                 <a:solidFill>
                   <a:srgbClr val="E4E6ED"/>
                 </a:solidFill>
@@ -6668,8 +6668,8 @@
         </p:nvSpPr>
         <p:spPr>
           <a:xfrm>
-            <a:off x="2258568" y="2286000"/>
-            <a:ext cx="1234440" cy="274320"/>
+            <a:off x="2212848" y="1691640"/>
+            <a:ext cx="1325880" cy="256032"/>
           </a:xfrm>
           <a:prstGeom prst="rect">
             <a:avLst/>
@@ -6683,7 +6683,7 @@
           <a:lstStyle/>
           <a:p>
             <a:pPr algn="l">
-              <a:defRPr sz="1200" b="1">
+              <a:defRPr sz="1100" b="1">
                 <a:solidFill>
                   <a:srgbClr val="06B6D4"/>
                 </a:solidFill>
@@ -6704,8 +6704,8 @@
         </p:nvSpPr>
         <p:spPr>
           <a:xfrm>
-            <a:off x="2258568" y="2651760"/>
-            <a:ext cx="1234440" cy="1097280"/>
+            <a:off x="2212848" y="1965960"/>
+            <a:ext cx="1325880" cy="731520"/>
           </a:xfrm>
           <a:prstGeom prst="rect">
             <a:avLst/>
@@ -6719,7 +6719,7 @@
           <a:lstStyle/>
           <a:p>
             <a:pPr algn="l">
-              <a:defRPr sz="1000" b="0">
+              <a:defRPr sz="900" b="0">
                 <a:solidFill>
                   <a:srgbClr val="8B8FA3"/>
                 </a:solidFill>
@@ -6727,11 +6727,11 @@
               </a:defRPr>
             </a:pPr>
             <a:r>
-              <a:t>Interactive charts,</a:t>
+              <a:t>Charts, heatmap</a:t>
             </a:r>
             <a:br/>
             <a:r>
-              <a:t>heatmap &amp; filters</a:t>
+              <a:t>&amp; filters</a:t>
             </a:r>
           </a:p>
         </p:txBody>
@@ -6744,8 +6744,8 @@
         </p:nvSpPr>
         <p:spPr>
           <a:xfrm>
-            <a:off x="3785616" y="1554480"/>
-            <a:ext cx="1508760" cy="2743200"/>
+            <a:off x="3785616" y="1143000"/>
+            <a:ext cx="1508760" cy="1828800"/>
           </a:xfrm>
           <a:prstGeom prst="roundRect">
             <a:avLst>
@@ -6791,7 +6791,7 @@
         </p:nvSpPr>
         <p:spPr>
           <a:xfrm>
-            <a:off x="3785616" y="1554480"/>
+            <a:off x="3785616" y="1143000"/>
             <a:ext cx="1508760" cy="45720"/>
           </a:xfrm>
           <a:prstGeom prst="rect">
@@ -6834,8 +6834,8 @@
         </p:nvSpPr>
         <p:spPr>
           <a:xfrm>
-            <a:off x="3922776" y="1737360"/>
-            <a:ext cx="365760" cy="365760"/>
+            <a:off x="3895344" y="1261872"/>
+            <a:ext cx="320040" cy="320040"/>
           </a:xfrm>
           <a:prstGeom prst="roundRect">
             <a:avLst>
@@ -6879,8 +6879,8 @@
         </p:nvSpPr>
         <p:spPr>
           <a:xfrm>
-            <a:off x="3922776" y="1737360"/>
-            <a:ext cx="365760" cy="365760"/>
+            <a:off x="3895344" y="1261872"/>
+            <a:ext cx="320040" cy="320040"/>
           </a:xfrm>
           <a:prstGeom prst="rect">
             <a:avLst/>
@@ -6894,7 +6894,7 @@
           <a:lstStyle/>
           <a:p>
             <a:pPr algn="ctr">
-              <a:defRPr sz="1400" b="1">
+              <a:defRPr sz="1100" b="1">
                 <a:solidFill>
                   <a:srgbClr val="E4E6ED"/>
                 </a:solidFill>
@@ -6915,8 +6915,8 @@
         </p:nvSpPr>
         <p:spPr>
           <a:xfrm>
-            <a:off x="3922776" y="2286000"/>
-            <a:ext cx="1234440" cy="274320"/>
+            <a:off x="3877056" y="1691640"/>
+            <a:ext cx="1325880" cy="256032"/>
           </a:xfrm>
           <a:prstGeom prst="rect">
             <a:avLst/>
@@ -6930,7 +6930,7 @@
           <a:lstStyle/>
           <a:p>
             <a:pPr algn="l">
-              <a:defRPr sz="1200" b="1">
+              <a:defRPr sz="1100" b="1">
                 <a:solidFill>
                   <a:srgbClr val="22C55E"/>
                 </a:solidFill>
@@ -6951,8 +6951,8 @@
         </p:nvSpPr>
         <p:spPr>
           <a:xfrm>
-            <a:off x="3922776" y="2651760"/>
-            <a:ext cx="1234440" cy="1097280"/>
+            <a:off x="3877056" y="1965960"/>
+            <a:ext cx="1325880" cy="731520"/>
           </a:xfrm>
           <a:prstGeom prst="rect">
             <a:avLst/>
@@ -6966,7 +6966,7 @@
           <a:lstStyle/>
           <a:p>
             <a:pPr algn="l">
-              <a:defRPr sz="1000" b="0">
+              <a:defRPr sz="900" b="0">
                 <a:solidFill>
                   <a:srgbClr val="8B8FA3"/>
                 </a:solidFill>
@@ -6978,7 +6978,7 @@
             </a:r>
             <a:br/>
             <a:r>
-              <a:t>&amp; risk calculator</a:t>
+              <a:t>calculator</a:t>
             </a:r>
           </a:p>
         </p:txBody>
@@ -6991,8 +6991,8 @@
         </p:nvSpPr>
         <p:spPr>
           <a:xfrm>
-            <a:off x="5449824" y="1554480"/>
-            <a:ext cx="1508760" cy="2743200"/>
+            <a:off x="5449824" y="1143000"/>
+            <a:ext cx="1508760" cy="1828800"/>
           </a:xfrm>
           <a:prstGeom prst="roundRect">
             <a:avLst>
@@ -7038,7 +7038,7 @@
         </p:nvSpPr>
         <p:spPr>
           <a:xfrm>
-            <a:off x="5449824" y="1554480"/>
+            <a:off x="5449824" y="1143000"/>
             <a:ext cx="1508760" cy="45720"/>
           </a:xfrm>
           <a:prstGeom prst="rect">
@@ -7081,8 +7081,8 @@
         </p:nvSpPr>
         <p:spPr>
           <a:xfrm>
-            <a:off x="5586984" y="1737360"/>
-            <a:ext cx="365760" cy="365760"/>
+            <a:off x="5559552" y="1261872"/>
+            <a:ext cx="320040" cy="320040"/>
           </a:xfrm>
           <a:prstGeom prst="roundRect">
             <a:avLst>
@@ -7126,8 +7126,8 @@
         </p:nvSpPr>
         <p:spPr>
           <a:xfrm>
-            <a:off x="5586984" y="1737360"/>
-            <a:ext cx="365760" cy="365760"/>
+            <a:off x="5559552" y="1261872"/>
+            <a:ext cx="320040" cy="320040"/>
           </a:xfrm>
           <a:prstGeom prst="rect">
             <a:avLst/>
@@ -7141,7 +7141,7 @@
           <a:lstStyle/>
           <a:p>
             <a:pPr algn="ctr">
-              <a:defRPr sz="1400" b="1">
+              <a:defRPr sz="1100" b="1">
                 <a:solidFill>
                   <a:srgbClr val="E4E6ED"/>
                 </a:solidFill>
@@ -7162,8 +7162,8 @@
         </p:nvSpPr>
         <p:spPr>
           <a:xfrm>
-            <a:off x="5586984" y="2286000"/>
-            <a:ext cx="1234440" cy="274320"/>
+            <a:off x="5541264" y="1691640"/>
+            <a:ext cx="1325880" cy="256032"/>
           </a:xfrm>
           <a:prstGeom prst="rect">
             <a:avLst/>
@@ -7177,7 +7177,7 @@
           <a:lstStyle/>
           <a:p>
             <a:pPr algn="l">
-              <a:defRPr sz="1200" b="1">
+              <a:defRPr sz="1100" b="1">
                 <a:solidFill>
                   <a:srgbClr val="F59E0B"/>
                 </a:solidFill>
@@ -7198,8 +7198,8 @@
         </p:nvSpPr>
         <p:spPr>
           <a:xfrm>
-            <a:off x="5586984" y="2651760"/>
-            <a:ext cx="1234440" cy="1097280"/>
+            <a:off x="5541264" y="1965960"/>
+            <a:ext cx="1325880" cy="731520"/>
           </a:xfrm>
           <a:prstGeom prst="rect">
             <a:avLst/>
@@ -7213,7 +7213,7 @@
           <a:lstStyle/>
           <a:p>
             <a:pPr algn="l">
-              <a:defRPr sz="1000" b="0">
+              <a:defRPr sz="900" b="0">
                 <a:solidFill>
                   <a:srgbClr val="8B8FA3"/>
                 </a:solidFill>
@@ -7221,11 +7221,11 @@
               </a:defRPr>
             </a:pPr>
             <a:r>
-              <a:t>Auto-generated slides</a:t>
+              <a:t>Auto-generated</a:t>
             </a:r>
             <a:br/>
             <a:r>
-              <a:t>with charts &amp; data</a:t>
+              <a:t>slides</a:t>
             </a:r>
           </a:p>
         </p:txBody>
@@ -7238,8 +7238,8 @@
         </p:nvSpPr>
         <p:spPr>
           <a:xfrm>
-            <a:off x="7114032" y="1554480"/>
-            <a:ext cx="1508760" cy="2743200"/>
+            <a:off x="7114032" y="1143000"/>
+            <a:ext cx="1508760" cy="1828800"/>
           </a:xfrm>
           <a:prstGeom prst="roundRect">
             <a:avLst>
@@ -7285,7 +7285,7 @@
         </p:nvSpPr>
         <p:spPr>
           <a:xfrm>
-            <a:off x="7114032" y="1554480"/>
+            <a:off x="7114032" y="1143000"/>
             <a:ext cx="1508760" cy="45720"/>
           </a:xfrm>
           <a:prstGeom prst="rect">
@@ -7328,8 +7328,8 @@
         </p:nvSpPr>
         <p:spPr>
           <a:xfrm>
-            <a:off x="7251192" y="1737360"/>
-            <a:ext cx="365760" cy="365760"/>
+            <a:off x="7223760" y="1261872"/>
+            <a:ext cx="320040" cy="320040"/>
           </a:xfrm>
           <a:prstGeom prst="roundRect">
             <a:avLst>
@@ -7373,8 +7373,8 @@
         </p:nvSpPr>
         <p:spPr>
           <a:xfrm>
-            <a:off x="7251192" y="1737360"/>
-            <a:ext cx="365760" cy="365760"/>
+            <a:off x="7223760" y="1261872"/>
+            <a:ext cx="320040" cy="320040"/>
           </a:xfrm>
           <a:prstGeom prst="rect">
             <a:avLst/>
@@ -7388,7 +7388,7 @@
           <a:lstStyle/>
           <a:p>
             <a:pPr algn="ctr">
-              <a:defRPr sz="1400" b="1">
+              <a:defRPr sz="1100" b="1">
                 <a:solidFill>
                   <a:srgbClr val="E4E6ED"/>
                 </a:solidFill>
@@ -7409,8 +7409,8 @@
         </p:nvSpPr>
         <p:spPr>
           <a:xfrm>
-            <a:off x="7251192" y="2286000"/>
-            <a:ext cx="1234440" cy="274320"/>
+            <a:off x="7205472" y="1691640"/>
+            <a:ext cx="1325880" cy="256032"/>
           </a:xfrm>
           <a:prstGeom prst="rect">
             <a:avLst/>
@@ -7424,7 +7424,7 @@
           <a:lstStyle/>
           <a:p>
             <a:pPr algn="l">
-              <a:defRPr sz="1200" b="1">
+              <a:defRPr sz="1100" b="1">
                 <a:solidFill>
                   <a:srgbClr val="818CF8"/>
                 </a:solidFill>
@@ -7445,8 +7445,8 @@
         </p:nvSpPr>
         <p:spPr>
           <a:xfrm>
-            <a:off x="7251192" y="2651760"/>
-            <a:ext cx="1234440" cy="1097280"/>
+            <a:off x="7205472" y="1965960"/>
+            <a:ext cx="1325880" cy="731520"/>
           </a:xfrm>
           <a:prstGeom prst="rect">
             <a:avLst/>
@@ -7460,7 +7460,7 @@
           <a:lstStyle/>
           <a:p>
             <a:pPr algn="l">
-              <a:defRPr sz="1000" b="0">
+              <a:defRPr sz="900" b="0">
                 <a:solidFill>
                   <a:srgbClr val="8B8FA3"/>
                 </a:solidFill>
@@ -7472,7 +7472,7 @@
             </a:r>
             <a:br/>
             <a:r>
-              <a:t>report with insights</a:t>
+              <a:t>report</a:t>
             </a:r>
           </a:p>
         </p:txBody>
@@ -7485,8 +7485,8 @@
         </p:nvSpPr>
         <p:spPr>
           <a:xfrm>
-            <a:off x="8778240" y="1554480"/>
-            <a:ext cx="1508760" cy="2743200"/>
+            <a:off x="8778240" y="1143000"/>
+            <a:ext cx="1508760" cy="1828800"/>
           </a:xfrm>
           <a:prstGeom prst="roundRect">
             <a:avLst>
@@ -7532,7 +7532,7 @@
         </p:nvSpPr>
         <p:spPr>
           <a:xfrm>
-            <a:off x="8778240" y="1554480"/>
+            <a:off x="8778240" y="1143000"/>
             <a:ext cx="1508760" cy="45720"/>
           </a:xfrm>
           <a:prstGeom prst="rect">
@@ -7575,8 +7575,8 @@
         </p:nvSpPr>
         <p:spPr>
           <a:xfrm>
-            <a:off x="8915400" y="1737360"/>
-            <a:ext cx="365760" cy="365760"/>
+            <a:off x="8887968" y="1261872"/>
+            <a:ext cx="320040" cy="320040"/>
           </a:xfrm>
           <a:prstGeom prst="roundRect">
             <a:avLst>
@@ -7620,8 +7620,8 @@
         </p:nvSpPr>
         <p:spPr>
           <a:xfrm>
-            <a:off x="8915400" y="1737360"/>
-            <a:ext cx="365760" cy="365760"/>
+            <a:off x="8887968" y="1261872"/>
+            <a:ext cx="320040" cy="320040"/>
           </a:xfrm>
           <a:prstGeom prst="rect">
             <a:avLst/>
@@ -7635,7 +7635,7 @@
           <a:lstStyle/>
           <a:p>
             <a:pPr algn="ctr">
-              <a:defRPr sz="1400" b="1">
+              <a:defRPr sz="1100" b="1">
                 <a:solidFill>
                   <a:srgbClr val="E4E6ED"/>
                 </a:solidFill>
@@ -7656,8 +7656,8 @@
         </p:nvSpPr>
         <p:spPr>
           <a:xfrm>
-            <a:off x="8915400" y="2286000"/>
-            <a:ext cx="1234440" cy="274320"/>
+            <a:off x="8869680" y="1691640"/>
+            <a:ext cx="1325880" cy="256032"/>
           </a:xfrm>
           <a:prstGeom prst="rect">
             <a:avLst/>
@@ -7671,7 +7671,7 @@
           <a:lstStyle/>
           <a:p>
             <a:pPr algn="l">
-              <a:defRPr sz="1200" b="1">
+              <a:defRPr sz="1100" b="1">
                 <a:solidFill>
                   <a:srgbClr val="F97316"/>
                 </a:solidFill>
@@ -7692,8 +7692,8 @@
         </p:nvSpPr>
         <p:spPr>
           <a:xfrm>
-            <a:off x="8915400" y="2651760"/>
-            <a:ext cx="1234440" cy="1097280"/>
+            <a:off x="8869680" y="1965960"/>
+            <a:ext cx="1325880" cy="731520"/>
           </a:xfrm>
           <a:prstGeom prst="rect">
             <a:avLst/>
@@ -7707,7 +7707,7 @@
           <a:lstStyle/>
           <a:p>
             <a:pPr algn="l">
-              <a:defRPr sz="1000" b="0">
+              <a:defRPr sz="900" b="0">
                 <a:solidFill>
                   <a:srgbClr val="8B8FA3"/>
                 </a:solidFill>
@@ -7715,11 +7715,11 @@
               </a:defRPr>
             </a:pPr>
             <a:r>
-              <a:t>Score-based anomaly</a:t>
+              <a:t>Score-based</a:t>
             </a:r>
             <a:br/>
             <a:r>
-              <a:t>detection system</a:t>
+              <a:t>anomalies</a:t>
             </a:r>
           </a:p>
         </p:txBody>
@@ -7732,8 +7732,8 @@
         </p:nvSpPr>
         <p:spPr>
           <a:xfrm>
-            <a:off x="10442448" y="1554480"/>
-            <a:ext cx="1508760" cy="2743200"/>
+            <a:off x="10442448" y="1143000"/>
+            <a:ext cx="1508760" cy="1828800"/>
           </a:xfrm>
           <a:prstGeom prst="roundRect">
             <a:avLst>
@@ -7779,7 +7779,7 @@
         </p:nvSpPr>
         <p:spPr>
           <a:xfrm>
-            <a:off x="10442448" y="1554480"/>
+            <a:off x="10442448" y="1143000"/>
             <a:ext cx="1508760" cy="45720"/>
           </a:xfrm>
           <a:prstGeom prst="rect">
@@ -7822,8 +7822,8 @@
         </p:nvSpPr>
         <p:spPr>
           <a:xfrm>
-            <a:off x="10579608" y="1737360"/>
-            <a:ext cx="365760" cy="365760"/>
+            <a:off x="10552176" y="1261872"/>
+            <a:ext cx="320040" cy="320040"/>
           </a:xfrm>
           <a:prstGeom prst="roundRect">
             <a:avLst>
@@ -7867,8 +7867,8 @@
         </p:nvSpPr>
         <p:spPr>
           <a:xfrm>
-            <a:off x="10579608" y="1737360"/>
-            <a:ext cx="365760" cy="365760"/>
+            <a:off x="10552176" y="1261872"/>
+            <a:ext cx="320040" cy="320040"/>
           </a:xfrm>
           <a:prstGeom prst="rect">
             <a:avLst/>
@@ -7882,7 +7882,7 @@
           <a:lstStyle/>
           <a:p>
             <a:pPr algn="ctr">
-              <a:defRPr sz="1400" b="1">
+              <a:defRPr sz="1100" b="1">
                 <a:solidFill>
                   <a:srgbClr val="E4E6ED"/>
                 </a:solidFill>
@@ -7903,8 +7903,8 @@
         </p:nvSpPr>
         <p:spPr>
           <a:xfrm>
-            <a:off x="10579608" y="2286000"/>
-            <a:ext cx="1234440" cy="274320"/>
+            <a:off x="10533888" y="1691640"/>
+            <a:ext cx="1325880" cy="256032"/>
           </a:xfrm>
           <a:prstGeom prst="rect">
             <a:avLst/>
@@ -7918,7 +7918,7 @@
           <a:lstStyle/>
           <a:p>
             <a:pPr algn="l">
-              <a:defRPr sz="1200" b="1">
+              <a:defRPr sz="1100" b="1">
                 <a:solidFill>
                   <a:srgbClr val="EC4899"/>
                 </a:solidFill>
@@ -7939,8 +7939,8 @@
         </p:nvSpPr>
         <p:spPr>
           <a:xfrm>
-            <a:off x="10579608" y="2651760"/>
-            <a:ext cx="1234440" cy="1097280"/>
+            <a:off x="10533888" y="1965960"/>
+            <a:ext cx="1325880" cy="731520"/>
           </a:xfrm>
           <a:prstGeom prst="rect">
             <a:avLst/>
@@ -7954,7 +7954,7 @@
           <a:lstStyle/>
           <a:p>
             <a:pPr algn="l">
-              <a:defRPr sz="1000" b="0">
+              <a:defRPr sz="900" b="0">
                 <a:solidFill>
                   <a:srgbClr val="8B8FA3"/>
                 </a:solidFill>
@@ -7962,72 +7962,25 @@
               </a:defRPr>
             </a:pPr>
             <a:r>
-              <a:t>NL Q&amp;A powered</a:t>
+              <a:t>NL Q&amp;A</a:t>
             </a:r>
             <a:br/>
             <a:r>
-              <a:t>by Claude AI</a:t>
-            </a:r>
-          </a:p>
-        </p:txBody>
-      </p:sp>
-      <p:sp>
-        <p:nvSpPr>
-          <p:cNvPr id="47" name="Rounded Rectangle 46"/>
-          <p:cNvSpPr/>
-          <p:nvPr/>
-        </p:nvSpPr>
-        <p:spPr>
-          <a:xfrm>
-            <a:off x="731520" y="5120640"/>
-            <a:ext cx="10698480" cy="1280160"/>
-          </a:xfrm>
-          <a:prstGeom prst="roundRect">
-            <a:avLst>
-              <a:gd name="adj" fmla="val 5000"/>
-            </a:avLst>
-          </a:prstGeom>
-          <a:solidFill>
-            <a:srgbClr val="1A1D27"/>
-          </a:solidFill>
-          <a:ln w="12700">
-            <a:solidFill>
-              <a:srgbClr val="2E3345"/>
-            </a:solidFill>
-          </a:ln>
-        </p:spPr>
-        <p:style>
-          <a:lnRef idx="1">
-            <a:schemeClr val="accent1"/>
-          </a:lnRef>
-          <a:fillRef idx="3">
-            <a:schemeClr val="accent1"/>
-          </a:fillRef>
-          <a:effectRef idx="2">
-            <a:schemeClr val="accent1"/>
-          </a:effectRef>
-          <a:fontRef idx="minor">
-            <a:schemeClr val="lt1"/>
-          </a:fontRef>
-        </p:style>
-        <p:txBody>
-          <a:bodyPr rtlCol="0" anchor="ctr"/>
-          <a:lstStyle/>
-          <a:p>
-            <a:pPr algn="ctr"/>
-          </a:p>
-        </p:txBody>
-      </p:sp>
-      <p:sp>
-        <p:nvSpPr>
-          <p:cNvPr id="48" name="TextBox 47"/>
+              <a:t>via AI</a:t>
+            </a:r>
+          </a:p>
+        </p:txBody>
+      </p:sp>
+      <p:sp>
+        <p:nvSpPr>
+          <p:cNvPr id="47" name="TextBox 46"/>
           <p:cNvSpPr txBox="1"/>
           <p:nvPr/>
         </p:nvSpPr>
         <p:spPr>
           <a:xfrm>
-            <a:off x="1005840" y="5349240"/>
-            <a:ext cx="10058400" cy="365760"/>
+            <a:off x="457200" y="3154680"/>
+            <a:ext cx="10972800" cy="274320"/>
           </a:xfrm>
           <a:prstGeom prst="rect">
             <a:avLst/>
@@ -8041,7 +7994,7 @@
           <a:lstStyle/>
           <a:p>
             <a:pPr algn="l">
-              <a:defRPr sz="1600" b="1">
+              <a:defRPr sz="1300" b="1">
                 <a:solidFill>
                   <a:srgbClr val="818CF8"/>
                 </a:solidFill>
@@ -8049,47 +8002,582 @@
               </a:defRPr>
             </a:pPr>
             <a:r>
-              <a:t>Key Takeaway</a:t>
-            </a:r>
-          </a:p>
-        </p:txBody>
-      </p:sp>
-      <p:sp>
-        <p:nvSpPr>
-          <p:cNvPr id="49" name="TextBox 48"/>
-          <p:cNvSpPr txBox="1"/>
-          <p:nvPr/>
-        </p:nvSpPr>
-        <p:spPr>
-          <a:xfrm>
-            <a:off x="1005840" y="5715000"/>
-            <a:ext cx="10058400" cy="457200"/>
-          </a:xfrm>
-          <a:prstGeom prst="rect">
-            <a:avLst/>
-          </a:prstGeom>
-          <a:noFill/>
-        </p:spPr>
-        <p:txBody>
-          <a:bodyPr wrap="square">
-            <a:spAutoFit/>
-          </a:bodyPr>
-          <a:lstStyle/>
-          <a:p>
-            <a:pPr algn="l">
-              <a:defRPr sz="1300" b="0">
-                <a:solidFill>
-                  <a:srgbClr val="E4E6ED"/>
-                </a:solidFill>
-                <a:latin typeface="Arial"/>
-              </a:defRPr>
-            </a:pPr>
-            <a:r>
-              <a:t>AI coding agents don't replace developers — they amplify them. 7 deliverables built in a single session, from raw data to polished reports.</a:t>
-            </a:r>
-          </a:p>
-        </p:txBody>
-      </p:sp>
+              <a:t>AI Speed Comparison  —  Minutes vs Days</a:t>
+            </a:r>
+          </a:p>
+        </p:txBody>
+      </p:sp>
+      <p:graphicFrame>
+        <p:nvGraphicFramePr>
+          <p:cNvPr id="48" name="Table 47"/>
+          <p:cNvGraphicFramePr>
+            <a:graphicFrameLocks noGrp="1"/>
+          </p:cNvGraphicFramePr>
+          <p:nvPr/>
+        </p:nvGraphicFramePr>
+        <p:xfrm>
+          <a:off x="457200" y="3493008"/>
+          <a:ext cx="11274552" cy="3200400"/>
+        </p:xfrm>
+        <a:graphic>
+          <a:graphicData uri="http://schemas.openxmlformats.org/drawingml/2006/table">
+            <a:tbl>
+              <a:tblPr firstRow="1" bandRow="1">
+                <a:tableStyleId>{5C22544A-7EE6-4342-B048-85BDC9FD1C3A}</a:tableStyleId>
+              </a:tblPr>
+              <a:tblGrid>
+                <a:gridCol w="2560320"/>
+                <a:gridCol w="5577840"/>
+                <a:gridCol w="3136392"/>
+              </a:tblGrid>
+              <a:tr h="400050">
+                <a:tc>
+                  <a:txBody>
+                    <a:bodyPr wrap="square"/>
+                    <a:lstStyle/>
+                    <a:p>
+                      <a:pPr algn="l"/>
+                      <a:r>
+                        <a:rPr sz="1000" b="1">
+                          <a:solidFill>
+                            <a:srgbClr val="E4E6ED"/>
+                          </a:solidFill>
+                        </a:rPr>
+                        <a:t>Deliverable</a:t>
+                      </a:r>
+                    </a:p>
+                  </a:txBody>
+                  <a:tcPr anchor="ctr">
+                    <a:solidFill>
+                      <a:srgbClr val="232733"/>
+                    </a:solidFill>
+                  </a:tcPr>
+                </a:tc>
+                <a:tc>
+                  <a:txBody>
+                    <a:bodyPr wrap="square"/>
+                    <a:lstStyle/>
+                    <a:p>
+                      <a:pPr algn="ctr"/>
+                      <a:r>
+                        <a:rPr sz="1000" b="1">
+                          <a:solidFill>
+                            <a:srgbClr val="E4E6ED"/>
+                          </a:solidFill>
+                        </a:rPr>
+                        <a:t>Traditional Approach</a:t>
+                      </a:r>
+                    </a:p>
+                  </a:txBody>
+                  <a:tcPr anchor="ctr">
+                    <a:solidFill>
+                      <a:srgbClr val="232733"/>
+                    </a:solidFill>
+                  </a:tcPr>
+                </a:tc>
+                <a:tc>
+                  <a:txBody>
+                    <a:bodyPr wrap="square"/>
+                    <a:lstStyle/>
+                    <a:p>
+                      <a:pPr algn="ctr"/>
+                      <a:r>
+                        <a:rPr sz="1000" b="1">
+                          <a:solidFill>
+                            <a:srgbClr val="E4E6ED"/>
+                          </a:solidFill>
+                        </a:rPr>
+                        <a:t>With AI Agent</a:t>
+                      </a:r>
+                    </a:p>
+                  </a:txBody>
+                  <a:tcPr anchor="ctr">
+                    <a:solidFill>
+                      <a:srgbClr val="232733"/>
+                    </a:solidFill>
+                  </a:tcPr>
+                </a:tc>
+              </a:tr>
+              <a:tr h="400050">
+                <a:tc>
+                  <a:txBody>
+                    <a:bodyPr wrap="square"/>
+                    <a:lstStyle/>
+                    <a:p>
+                      <a:pPr algn="l"/>
+                      <a:r>
+                        <a:rPr sz="1000" b="1">
+                          <a:solidFill>
+                            <a:srgbClr val="E4E6ED"/>
+                          </a:solidFill>
+                        </a:rPr>
+                        <a:t>Mock Data Generation</a:t>
+                      </a:r>
+                    </a:p>
+                  </a:txBody>
+                  <a:tcPr anchor="ctr">
+                    <a:solidFill>
+                      <a:srgbClr val="1A1D27"/>
+                    </a:solidFill>
+                  </a:tcPr>
+                </a:tc>
+                <a:tc>
+                  <a:txBody>
+                    <a:bodyPr wrap="square"/>
+                    <a:lstStyle/>
+                    <a:p>
+                      <a:pPr algn="ctr"/>
+                      <a:r>
+                        <a:rPr sz="1000" b="0">
+                          <a:solidFill>
+                            <a:srgbClr val="F97316"/>
+                          </a:solidFill>
+                        </a:rPr>
+                        <a:t>1–2 days  (data team setup)</a:t>
+                      </a:r>
+                    </a:p>
+                  </a:txBody>
+                  <a:tcPr anchor="ctr">
+                    <a:solidFill>
+                      <a:srgbClr val="221010"/>
+                    </a:solidFill>
+                  </a:tcPr>
+                </a:tc>
+                <a:tc>
+                  <a:txBody>
+                    <a:bodyPr wrap="square"/>
+                    <a:lstStyle/>
+                    <a:p>
+                      <a:pPr algn="ctr"/>
+                      <a:r>
+                        <a:rPr sz="1000" b="0">
+                          <a:solidFill>
+                            <a:srgbClr val="22C55E"/>
+                          </a:solidFill>
+                        </a:rPr>
+                        <a:t>~5 min</a:t>
+                      </a:r>
+                    </a:p>
+                  </a:txBody>
+                  <a:tcPr anchor="ctr">
+                    <a:solidFill>
+                      <a:srgbClr val="0D2214"/>
+                    </a:solidFill>
+                  </a:tcPr>
+                </a:tc>
+              </a:tr>
+              <a:tr h="400050">
+                <a:tc>
+                  <a:txBody>
+                    <a:bodyPr wrap="square"/>
+                    <a:lstStyle/>
+                    <a:p>
+                      <a:pPr algn="l"/>
+                      <a:r>
+                        <a:rPr sz="1000" b="1">
+                          <a:solidFill>
+                            <a:srgbClr val="E4E6ED"/>
+                          </a:solidFill>
+                        </a:rPr>
+                        <a:t>Interactive Dashboard</a:t>
+                      </a:r>
+                    </a:p>
+                  </a:txBody>
+                  <a:tcPr anchor="ctr">
+                    <a:solidFill>
+                      <a:srgbClr val="1A1D27"/>
+                    </a:solidFill>
+                  </a:tcPr>
+                </a:tc>
+                <a:tc>
+                  <a:txBody>
+                    <a:bodyPr wrap="square"/>
+                    <a:lstStyle/>
+                    <a:p>
+                      <a:pPr algn="ctr"/>
+                      <a:r>
+                        <a:rPr sz="1000" b="0">
+                          <a:solidFill>
+                            <a:srgbClr val="F97316"/>
+                          </a:solidFill>
+                        </a:rPr>
+                        <a:t>1–2 weeks  (frontend dev)</a:t>
+                      </a:r>
+                    </a:p>
+                  </a:txBody>
+                  <a:tcPr anchor="ctr">
+                    <a:solidFill>
+                      <a:srgbClr val="221010"/>
+                    </a:solidFill>
+                  </a:tcPr>
+                </a:tc>
+                <a:tc>
+                  <a:txBody>
+                    <a:bodyPr wrap="square"/>
+                    <a:lstStyle/>
+                    <a:p>
+                      <a:pPr algn="ctr"/>
+                      <a:r>
+                        <a:rPr sz="1000" b="0">
+                          <a:solidFill>
+                            <a:srgbClr val="22C55E"/>
+                          </a:solidFill>
+                        </a:rPr>
+                        <a:t>~30 min</a:t>
+                      </a:r>
+                    </a:p>
+                  </a:txBody>
+                  <a:tcPr anchor="ctr">
+                    <a:solidFill>
+                      <a:srgbClr val="0D2214"/>
+                    </a:solidFill>
+                  </a:tcPr>
+                </a:tc>
+              </a:tr>
+              <a:tr h="400050">
+                <a:tc>
+                  <a:txBody>
+                    <a:bodyPr wrap="square"/>
+                    <a:lstStyle/>
+                    <a:p>
+                      <a:pPr algn="l"/>
+                      <a:r>
+                        <a:rPr sz="1000" b="1">
+                          <a:solidFill>
+                            <a:srgbClr val="E4E6ED"/>
+                          </a:solidFill>
+                        </a:rPr>
+                        <a:t>Premium Predictor</a:t>
+                      </a:r>
+                    </a:p>
+                  </a:txBody>
+                  <a:tcPr anchor="ctr">
+                    <a:solidFill>
+                      <a:srgbClr val="1A1D27"/>
+                    </a:solidFill>
+                  </a:tcPr>
+                </a:tc>
+                <a:tc>
+                  <a:txBody>
+                    <a:bodyPr wrap="square"/>
+                    <a:lstStyle/>
+                    <a:p>
+                      <a:pPr algn="ctr"/>
+                      <a:r>
+                        <a:rPr sz="1000" b="0">
+                          <a:solidFill>
+                            <a:srgbClr val="F97316"/>
+                          </a:solidFill>
+                        </a:rPr>
+                        <a:t>3–5 days  (model dev)</a:t>
+                      </a:r>
+                    </a:p>
+                  </a:txBody>
+                  <a:tcPr anchor="ctr">
+                    <a:solidFill>
+                      <a:srgbClr val="221010"/>
+                    </a:solidFill>
+                  </a:tcPr>
+                </a:tc>
+                <a:tc>
+                  <a:txBody>
+                    <a:bodyPr wrap="square"/>
+                    <a:lstStyle/>
+                    <a:p>
+                      <a:pPr algn="ctr"/>
+                      <a:r>
+                        <a:rPr sz="1000" b="0">
+                          <a:solidFill>
+                            <a:srgbClr val="22C55E"/>
+                          </a:solidFill>
+                        </a:rPr>
+                        <a:t>~15 min</a:t>
+                      </a:r>
+                    </a:p>
+                  </a:txBody>
+                  <a:tcPr anchor="ctr">
+                    <a:solidFill>
+                      <a:srgbClr val="0D2214"/>
+                    </a:solidFill>
+                  </a:tcPr>
+                </a:tc>
+              </a:tr>
+              <a:tr h="400050">
+                <a:tc>
+                  <a:txBody>
+                    <a:bodyPr wrap="square"/>
+                    <a:lstStyle/>
+                    <a:p>
+                      <a:pPr algn="l"/>
+                      <a:r>
+                        <a:rPr sz="1000" b="1">
+                          <a:solidFill>
+                            <a:srgbClr val="E4E6ED"/>
+                          </a:solidFill>
+                        </a:rPr>
+                        <a:t>Presentation</a:t>
+                      </a:r>
+                    </a:p>
+                  </a:txBody>
+                  <a:tcPr anchor="ctr">
+                    <a:solidFill>
+                      <a:srgbClr val="1A1D27"/>
+                    </a:solidFill>
+                  </a:tcPr>
+                </a:tc>
+                <a:tc>
+                  <a:txBody>
+                    <a:bodyPr wrap="square"/>
+                    <a:lstStyle/>
+                    <a:p>
+                      <a:pPr algn="ctr"/>
+                      <a:r>
+                        <a:rPr sz="1000" b="0">
+                          <a:solidFill>
+                            <a:srgbClr val="F97316"/>
+                          </a:solidFill>
+                        </a:rPr>
+                        <a:t>1–2 days  (manual slides)</a:t>
+                      </a:r>
+                    </a:p>
+                  </a:txBody>
+                  <a:tcPr anchor="ctr">
+                    <a:solidFill>
+                      <a:srgbClr val="221010"/>
+                    </a:solidFill>
+                  </a:tcPr>
+                </a:tc>
+                <a:tc>
+                  <a:txBody>
+                    <a:bodyPr wrap="square"/>
+                    <a:lstStyle/>
+                    <a:p>
+                      <a:pPr algn="ctr"/>
+                      <a:r>
+                        <a:rPr sz="1000" b="0">
+                          <a:solidFill>
+                            <a:srgbClr val="22C55E"/>
+                          </a:solidFill>
+                        </a:rPr>
+                        <a:t>~10 min</a:t>
+                      </a:r>
+                    </a:p>
+                  </a:txBody>
+                  <a:tcPr anchor="ctr">
+                    <a:solidFill>
+                      <a:srgbClr val="0D2214"/>
+                    </a:solidFill>
+                  </a:tcPr>
+                </a:tc>
+              </a:tr>
+              <a:tr h="400050">
+                <a:tc>
+                  <a:txBody>
+                    <a:bodyPr wrap="square"/>
+                    <a:lstStyle/>
+                    <a:p>
+                      <a:pPr algn="l"/>
+                      <a:r>
+                        <a:rPr sz="1000" b="1">
+                          <a:solidFill>
+                            <a:srgbClr val="E4E6ED"/>
+                          </a:solidFill>
+                        </a:rPr>
+                        <a:t>PDF Actuarial Report</a:t>
+                      </a:r>
+                    </a:p>
+                  </a:txBody>
+                  <a:tcPr anchor="ctr">
+                    <a:solidFill>
+                      <a:srgbClr val="1A1D27"/>
+                    </a:solidFill>
+                  </a:tcPr>
+                </a:tc>
+                <a:tc>
+                  <a:txBody>
+                    <a:bodyPr wrap="square"/>
+                    <a:lstStyle/>
+                    <a:p>
+                      <a:pPr algn="ctr"/>
+                      <a:r>
+                        <a:rPr sz="1000" b="0">
+                          <a:solidFill>
+                            <a:srgbClr val="F97316"/>
+                          </a:solidFill>
+                        </a:rPr>
+                        <a:t>3–5 days  (report team)</a:t>
+                      </a:r>
+                    </a:p>
+                  </a:txBody>
+                  <a:tcPr anchor="ctr">
+                    <a:solidFill>
+                      <a:srgbClr val="221010"/>
+                    </a:solidFill>
+                  </a:tcPr>
+                </a:tc>
+                <a:tc>
+                  <a:txBody>
+                    <a:bodyPr wrap="square"/>
+                    <a:lstStyle/>
+                    <a:p>
+                      <a:pPr algn="ctr"/>
+                      <a:r>
+                        <a:rPr sz="1000" b="0">
+                          <a:solidFill>
+                            <a:srgbClr val="22C55E"/>
+                          </a:solidFill>
+                        </a:rPr>
+                        <a:t>~20 min</a:t>
+                      </a:r>
+                    </a:p>
+                  </a:txBody>
+                  <a:tcPr anchor="ctr">
+                    <a:solidFill>
+                      <a:srgbClr val="0D2214"/>
+                    </a:solidFill>
+                  </a:tcPr>
+                </a:tc>
+              </a:tr>
+              <a:tr h="400050">
+                <a:tc>
+                  <a:txBody>
+                    <a:bodyPr wrap="square"/>
+                    <a:lstStyle/>
+                    <a:p>
+                      <a:pPr algn="l"/>
+                      <a:r>
+                        <a:rPr sz="1000" b="1">
+                          <a:solidFill>
+                            <a:srgbClr val="E4E6ED"/>
+                          </a:solidFill>
+                        </a:rPr>
+                        <a:t>Fraud Detection</a:t>
+                      </a:r>
+                    </a:p>
+                  </a:txBody>
+                  <a:tcPr anchor="ctr">
+                    <a:solidFill>
+                      <a:srgbClr val="1A1D27"/>
+                    </a:solidFill>
+                  </a:tcPr>
+                </a:tc>
+                <a:tc>
+                  <a:txBody>
+                    <a:bodyPr wrap="square"/>
+                    <a:lstStyle/>
+                    <a:p>
+                      <a:pPr algn="ctr"/>
+                      <a:r>
+                        <a:rPr sz="1000" b="0">
+                          <a:solidFill>
+                            <a:srgbClr val="F97316"/>
+                          </a:solidFill>
+                        </a:rPr>
+                        <a:t>2–4 weeks  (data science team)</a:t>
+                      </a:r>
+                    </a:p>
+                  </a:txBody>
+                  <a:tcPr anchor="ctr">
+                    <a:solidFill>
+                      <a:srgbClr val="221010"/>
+                    </a:solidFill>
+                  </a:tcPr>
+                </a:tc>
+                <a:tc>
+                  <a:txBody>
+                    <a:bodyPr wrap="square"/>
+                    <a:lstStyle/>
+                    <a:p>
+                      <a:pPr algn="ctr"/>
+                      <a:r>
+                        <a:rPr sz="1000" b="0">
+                          <a:solidFill>
+                            <a:srgbClr val="22C55E"/>
+                          </a:solidFill>
+                        </a:rPr>
+                        <a:t>~30 min</a:t>
+                      </a:r>
+                    </a:p>
+                  </a:txBody>
+                  <a:tcPr anchor="ctr">
+                    <a:solidFill>
+                      <a:srgbClr val="0D2214"/>
+                    </a:solidFill>
+                  </a:tcPr>
+                </a:tc>
+              </a:tr>
+              <a:tr h="400050">
+                <a:tc>
+                  <a:txBody>
+                    <a:bodyPr wrap="square"/>
+                    <a:lstStyle/>
+                    <a:p>
+                      <a:pPr algn="l"/>
+                      <a:r>
+                        <a:rPr sz="1000" b="1">
+                          <a:solidFill>
+                            <a:srgbClr val="E4E6ED"/>
+                          </a:solidFill>
+                        </a:rPr>
+                        <a:t>NL Data Chatbot</a:t>
+                      </a:r>
+                    </a:p>
+                  </a:txBody>
+                  <a:tcPr anchor="ctr">
+                    <a:solidFill>
+                      <a:srgbClr val="1A1D27"/>
+                    </a:solidFill>
+                  </a:tcPr>
+                </a:tc>
+                <a:tc>
+                  <a:txBody>
+                    <a:bodyPr wrap="square"/>
+                    <a:lstStyle/>
+                    <a:p>
+                      <a:pPr algn="ctr"/>
+                      <a:r>
+                        <a:rPr sz="1000" b="0">
+                          <a:solidFill>
+                            <a:srgbClr val="F97316"/>
+                          </a:solidFill>
+                        </a:rPr>
+                        <a:t>1–2 months  (dev team)</a:t>
+                      </a:r>
+                    </a:p>
+                  </a:txBody>
+                  <a:tcPr anchor="ctr">
+                    <a:solidFill>
+                      <a:srgbClr val="221010"/>
+                    </a:solidFill>
+                  </a:tcPr>
+                </a:tc>
+                <a:tc>
+                  <a:txBody>
+                    <a:bodyPr wrap="square"/>
+                    <a:lstStyle/>
+                    <a:p>
+                      <a:pPr algn="ctr"/>
+                      <a:r>
+                        <a:rPr sz="1000" b="0">
+                          <a:solidFill>
+                            <a:srgbClr val="22C55E"/>
+                          </a:solidFill>
+                        </a:rPr>
+                        <a:t>~45 min</a:t>
+                      </a:r>
+                    </a:p>
+                  </a:txBody>
+                  <a:tcPr anchor="ctr">
+                    <a:solidFill>
+                      <a:srgbClr val="0D2214"/>
+                    </a:solidFill>
+                  </a:tcPr>
+                </a:tc>
+              </a:tr>
+            </a:tbl>
+          </a:graphicData>
+        </a:graphic>
+      </p:graphicFrame>
     </p:spTree>
   </p:cSld>
   <p:clrMapOvr>

</xml_diff>